<commit_message>
Update presentation files for SQL Server sessions with new content
</commit_message>
<xml_diff>
--- a/Sessions/Building a Bulletproof SQL Server Development Environment/2025-07-19 - SQLSATSF/Bulletproof Dev Env.pptx
+++ b/Sessions/Building a Bulletproof SQL Server Development Environment/2025-07-19 - SQLSATSF/Bulletproof Dev Env.pptx
@@ -17,7 +17,7 @@
     <p:sldId id="266" r:id="rId11"/>
     <p:sldId id="267" r:id="rId12"/>
     <p:sldId id="268" r:id="rId13"/>
-    <p:sldId id="269" r:id="rId14"/>
+    <p:sldId id="276" r:id="rId14"/>
   </p:sldIdLst>
   <p:sldSz cx="12192000" cy="6858000"/>
   <p:notesSz cx="6858000" cy="9144000"/>
@@ -116,6 +116,11 @@
       </a:defRPr>
     </a:lvl9pPr>
   </p:defaultTextStyle>
+  <p:extLst>
+    <p:ext uri="{EFAFB233-063F-42B5-8137-9DF3F51BA10A}">
+      <p15:sldGuideLst xmlns:p15="http://schemas.microsoft.com/office/powerpoint/2012/main"/>
+    </p:ext>
+  </p:extLst>
 </p:presentation>
 </file>
 
@@ -266,7 +271,7 @@
           <a:p>
             <a:fld id="{C6189429-AE6F-421E-9CB0-E837E0542F78}" type="datetimeFigureOut">
               <a:rPr lang="en-US" smtClean="0"/>
-              <a:t>7/16/2025</a:t>
+              <a:t>7/17/2025</a:t>
             </a:fld>
             <a:endParaRPr lang="en-US"/>
           </a:p>
@@ -464,7 +469,7 @@
           <a:p>
             <a:fld id="{C6189429-AE6F-421E-9CB0-E837E0542F78}" type="datetimeFigureOut">
               <a:rPr lang="en-US" smtClean="0"/>
-              <a:t>7/16/2025</a:t>
+              <a:t>7/17/2025</a:t>
             </a:fld>
             <a:endParaRPr lang="en-US"/>
           </a:p>
@@ -672,7 +677,7 @@
           <a:p>
             <a:fld id="{C6189429-AE6F-421E-9CB0-E837E0542F78}" type="datetimeFigureOut">
               <a:rPr lang="en-US" smtClean="0"/>
-              <a:t>7/16/2025</a:t>
+              <a:t>7/17/2025</a:t>
             </a:fld>
             <a:endParaRPr lang="en-US"/>
           </a:p>
@@ -870,7 +875,7 @@
           <a:p>
             <a:fld id="{581DCB6A-2792-495A-965A-5F7D0E679DB1}" type="datetimeFigureOut">
               <a:rPr lang="en-US" smtClean="0"/>
-              <a:t>7/16/2025</a:t>
+              <a:t>7/17/2025</a:t>
             </a:fld>
             <a:endParaRPr lang="en-US"/>
           </a:p>
@@ -1068,7 +1073,7 @@
           <a:p>
             <a:fld id="{C6189429-AE6F-421E-9CB0-E837E0542F78}" type="datetimeFigureOut">
               <a:rPr lang="en-US" smtClean="0"/>
-              <a:t>7/16/2025</a:t>
+              <a:t>7/17/2025</a:t>
             </a:fld>
             <a:endParaRPr lang="en-US"/>
           </a:p>
@@ -1343,7 +1348,7 @@
           <a:p>
             <a:fld id="{C6189429-AE6F-421E-9CB0-E837E0542F78}" type="datetimeFigureOut">
               <a:rPr lang="en-US" smtClean="0"/>
-              <a:t>7/16/2025</a:t>
+              <a:t>7/17/2025</a:t>
             </a:fld>
             <a:endParaRPr lang="en-US"/>
           </a:p>
@@ -1608,7 +1613,7 @@
           <a:p>
             <a:fld id="{C6189429-AE6F-421E-9CB0-E837E0542F78}" type="datetimeFigureOut">
               <a:rPr lang="en-US" smtClean="0"/>
-              <a:t>7/16/2025</a:t>
+              <a:t>7/17/2025</a:t>
             </a:fld>
             <a:endParaRPr lang="en-US"/>
           </a:p>
@@ -2020,7 +2025,7 @@
           <a:p>
             <a:fld id="{C6189429-AE6F-421E-9CB0-E837E0542F78}" type="datetimeFigureOut">
               <a:rPr lang="en-US" smtClean="0"/>
-              <a:t>7/16/2025</a:t>
+              <a:t>7/17/2025</a:t>
             </a:fld>
             <a:endParaRPr lang="en-US"/>
           </a:p>
@@ -2161,7 +2166,7 @@
           <a:p>
             <a:fld id="{C6189429-AE6F-421E-9CB0-E837E0542F78}" type="datetimeFigureOut">
               <a:rPr lang="en-US" smtClean="0"/>
-              <a:t>7/16/2025</a:t>
+              <a:t>7/17/2025</a:t>
             </a:fld>
             <a:endParaRPr lang="en-US"/>
           </a:p>
@@ -2274,7 +2279,7 @@
           <a:p>
             <a:fld id="{C6189429-AE6F-421E-9CB0-E837E0542F78}" type="datetimeFigureOut">
               <a:rPr lang="en-US" smtClean="0"/>
-              <a:t>7/16/2025</a:t>
+              <a:t>7/17/2025</a:t>
             </a:fld>
             <a:endParaRPr lang="en-US"/>
           </a:p>
@@ -2585,7 +2590,7 @@
           <a:p>
             <a:fld id="{C6189429-AE6F-421E-9CB0-E837E0542F78}" type="datetimeFigureOut">
               <a:rPr lang="en-US" smtClean="0"/>
-              <a:t>7/16/2025</a:t>
+              <a:t>7/17/2025</a:t>
             </a:fld>
             <a:endParaRPr lang="en-US"/>
           </a:p>
@@ -2873,7 +2878,7 @@
           <a:p>
             <a:fld id="{C6189429-AE6F-421E-9CB0-E837E0542F78}" type="datetimeFigureOut">
               <a:rPr lang="en-US" smtClean="0"/>
-              <a:t>7/16/2025</a:t>
+              <a:t>7/17/2025</a:t>
             </a:fld>
             <a:endParaRPr lang="en-US"/>
           </a:p>
@@ -3114,7 +3119,7 @@
           <a:p>
             <a:fld id="{C6189429-AE6F-421E-9CB0-E837E0542F78}" type="datetimeFigureOut">
               <a:rPr lang="en-US" smtClean="0"/>
-              <a:t>7/16/2025</a:t>
+              <a:t>7/17/2025</a:t>
             </a:fld>
             <a:endParaRPr lang="en-US"/>
           </a:p>
@@ -4192,6 +4197,51 @@
           </a:p>
         </p:txBody>
       </p:sp>
+      <p:sp>
+        <p:nvSpPr>
+          <p:cNvPr id="4" name="AutoShape 2">
+            <a:extLst>
+              <a:ext uri="{FF2B5EF4-FFF2-40B4-BE49-F238E27FC236}">
+                <a16:creationId xmlns:a16="http://schemas.microsoft.com/office/drawing/2014/main" id="{D94F61C7-60EC-BBE7-F6D8-596F4736EDFF}"/>
+              </a:ext>
+            </a:extLst>
+          </p:cNvPr>
+          <p:cNvSpPr>
+            <a:spLocks noChangeAspect="1" noChangeArrowheads="1"/>
+          </p:cNvSpPr>
+          <p:nvPr/>
+        </p:nvSpPr>
+        <p:spPr bwMode="auto">
+          <a:xfrm>
+            <a:off x="5943600" y="3276600"/>
+            <a:ext cx="304800" cy="304800"/>
+          </a:xfrm>
+          <a:prstGeom prst="rect">
+            <a:avLst/>
+          </a:prstGeom>
+          <a:noFill/>
+          <a:extLst>
+            <a:ext uri="{909E8E84-426E-40DD-AFC4-6F175D3DCCD1}">
+              <a14:hiddenFill xmlns:a14="http://schemas.microsoft.com/office/drawing/2010/main">
+                <a:solidFill>
+                  <a:srgbClr val="FFFFFF"/>
+                </a:solidFill>
+              </a14:hiddenFill>
+            </a:ext>
+          </a:extLst>
+        </p:spPr>
+        <p:txBody>
+          <a:bodyPr vert="horz" wrap="square" lIns="91440" tIns="45720" rIns="91440" bIns="45720" numCol="1" anchor="t" anchorCtr="0" compatLnSpc="1">
+            <a:prstTxWarp prst="textNoShape">
+              <a:avLst/>
+            </a:prstTxWarp>
+          </a:bodyPr>
+          <a:lstStyle/>
+          <a:p>
+            <a:endParaRPr lang="en-US"/>
+          </a:p>
+        </p:txBody>
+      </p:sp>
     </p:spTree>
     <p:extLst>
       <p:ext uri="{BB962C8B-B14F-4D97-AF65-F5344CB8AC3E}">
@@ -4353,6 +4403,51 @@
           </a:p>
         </p:txBody>
       </p:sp>
+      <p:sp>
+        <p:nvSpPr>
+          <p:cNvPr id="4" name="AutoShape 2">
+            <a:extLst>
+              <a:ext uri="{FF2B5EF4-FFF2-40B4-BE49-F238E27FC236}">
+                <a16:creationId xmlns:a16="http://schemas.microsoft.com/office/drawing/2014/main" id="{1D105139-EF9F-02E4-D1A4-F957DD72F8B6}"/>
+              </a:ext>
+            </a:extLst>
+          </p:cNvPr>
+          <p:cNvSpPr>
+            <a:spLocks noChangeAspect="1" noChangeArrowheads="1"/>
+          </p:cNvSpPr>
+          <p:nvPr/>
+        </p:nvSpPr>
+        <p:spPr bwMode="auto">
+          <a:xfrm>
+            <a:off x="5943600" y="3276600"/>
+            <a:ext cx="304800" cy="304800"/>
+          </a:xfrm>
+          <a:prstGeom prst="rect">
+            <a:avLst/>
+          </a:prstGeom>
+          <a:noFill/>
+          <a:extLst>
+            <a:ext uri="{909E8E84-426E-40DD-AFC4-6F175D3DCCD1}">
+              <a14:hiddenFill xmlns:a14="http://schemas.microsoft.com/office/drawing/2010/main">
+                <a:solidFill>
+                  <a:srgbClr val="FFFFFF"/>
+                </a:solidFill>
+              </a14:hiddenFill>
+            </a:ext>
+          </a:extLst>
+        </p:spPr>
+        <p:txBody>
+          <a:bodyPr vert="horz" wrap="square" lIns="91440" tIns="45720" rIns="91440" bIns="45720" numCol="1" anchor="t" anchorCtr="0" compatLnSpc="1">
+            <a:prstTxWarp prst="textNoShape">
+              <a:avLst/>
+            </a:prstTxWarp>
+          </a:bodyPr>
+          <a:lstStyle/>
+          <a:p>
+            <a:endParaRPr lang="en-US"/>
+          </a:p>
+        </p:txBody>
+      </p:sp>
     </p:spTree>
     <p:extLst>
       <p:ext uri="{BB962C8B-B14F-4D97-AF65-F5344CB8AC3E}">
@@ -4388,7 +4483,7 @@
           <p:cNvPr id="2" name="Title 1">
             <a:extLst>
               <a:ext uri="{FF2B5EF4-FFF2-40B4-BE49-F238E27FC236}">
-                <a16:creationId xmlns:a16="http://schemas.microsoft.com/office/drawing/2014/main" id="{E79F0797-32A1-632A-782E-61C934B3C225}"/>
+                <a16:creationId xmlns:a16="http://schemas.microsoft.com/office/drawing/2014/main" id="{DCF86A19-934B-D4A8-D6FA-0DF65614C229}"/>
               </a:ext>
             </a:extLst>
           </p:cNvPr>
@@ -4401,29 +4496,115 @@
         </p:nvSpPr>
         <p:spPr/>
         <p:txBody>
-          <a:bodyPr/>
+          <a:bodyPr>
+            <a:normAutofit/>
+          </a:bodyPr>
           <a:lstStyle/>
           <a:p>
             <a:pPr marR="0" rtl="0"/>
             <a:r>
-              <a:rPr lang="en-US" b="0" i="0" u="none" strike="noStrike" kern="100" baseline="0">
-                <a:solidFill>
-                  <a:srgbClr val="0F4761"/>
-                </a:solidFill>
-                <a:latin typeface="Times New Roman" panose="02020603050405020304" pitchFamily="18" charset="0"/>
-              </a:rPr>
-              <a:t> </a:t>
-            </a:r>
-            <a:r>
-              <a:rPr lang="en-US" b="1" i="0" u="none" strike="noStrike" kern="100" baseline="0">
-                <a:solidFill>
-                  <a:srgbClr val="0F4761"/>
-                </a:solidFill>
-                <a:latin typeface="Times New Roman" panose="02020603050405020304" pitchFamily="18" charset="0"/>
-              </a:rPr>
-              <a:t>Slide 10: Q&amp;A / Thank You</a:t>
-            </a:r>
-            <a:endParaRPr lang="en-US" b="0" i="0" u="none" strike="noStrike" kern="100" baseline="0">
+              <a:rPr lang="en-US" sz="7200" b="0" i="0" u="none" strike="noStrike" kern="100" baseline="0" dirty="0">
+                <a:solidFill>
+                  <a:srgbClr val="0F4761"/>
+                </a:solidFill>
+                <a:latin typeface="Times New Roman" panose="02020603050405020304" pitchFamily="18" charset="0"/>
+              </a:rPr>
+              <a:t>Thank You!</a:t>
+            </a:r>
+          </a:p>
+        </p:txBody>
+      </p:sp>
+      <p:sp>
+        <p:nvSpPr>
+          <p:cNvPr id="3" name="Text Placeholder 2">
+            <a:extLst>
+              <a:ext uri="{FF2B5EF4-FFF2-40B4-BE49-F238E27FC236}">
+                <a16:creationId xmlns:a16="http://schemas.microsoft.com/office/drawing/2014/main" id="{30CE9D2C-F27A-85AA-5286-61D4000A287A}"/>
+              </a:ext>
+            </a:extLst>
+          </p:cNvPr>
+          <p:cNvSpPr>
+            <a:spLocks noGrp="1"/>
+          </p:cNvSpPr>
+          <p:nvPr>
+            <p:ph type="body" idx="1"/>
+          </p:nvPr>
+        </p:nvSpPr>
+        <p:spPr>
+          <a:xfrm>
+            <a:off x="4979415" y="3771900"/>
+            <a:ext cx="2362200" cy="2574036"/>
+          </a:xfrm>
+        </p:spPr>
+        <p:txBody>
+          <a:bodyPr>
+            <a:normAutofit fontScale="92500" lnSpcReduction="10000"/>
+          </a:bodyPr>
+          <a:lstStyle/>
+          <a:p>
+            <a:r>
+              <a:rPr lang="en-US" b="1" i="0" u="none" strike="noStrike" kern="100" baseline="0" dirty="0">
+                <a:solidFill>
+                  <a:srgbClr val="0F4761"/>
+                </a:solidFill>
+                <a:latin typeface="Times New Roman" panose="02020603050405020304" pitchFamily="18" charset="0"/>
+              </a:rPr>
+              <a:t>Slides</a:t>
+            </a:r>
+          </a:p>
+          <a:p>
+            <a:r>
+              <a:rPr lang="en-US" b="1" i="0" u="none" strike="noStrike" kern="100" baseline="0" dirty="0">
+                <a:solidFill>
+                  <a:srgbClr val="0F4761"/>
+                </a:solidFill>
+                <a:latin typeface="Times New Roman" panose="02020603050405020304" pitchFamily="18" charset="0"/>
+              </a:rPr>
+              <a:t>Scripts</a:t>
+            </a:r>
+          </a:p>
+          <a:p>
+            <a:r>
+              <a:rPr lang="en-US" b="1" kern="100" dirty="0">
+                <a:solidFill>
+                  <a:srgbClr val="0F4761"/>
+                </a:solidFill>
+                <a:latin typeface="Times New Roman" panose="02020603050405020304" pitchFamily="18" charset="0"/>
+              </a:rPr>
+              <a:t>D</a:t>
+            </a:r>
+            <a:r>
+              <a:rPr lang="en-US" b="1" i="0" u="none" strike="noStrike" kern="100" baseline="0" dirty="0">
+                <a:solidFill>
+                  <a:srgbClr val="0F4761"/>
+                </a:solidFill>
+                <a:latin typeface="Times New Roman" panose="02020603050405020304" pitchFamily="18" charset="0"/>
+              </a:rPr>
+              <a:t>emos!</a:t>
+            </a:r>
+          </a:p>
+          <a:p>
+            <a:r>
+              <a:rPr lang="en-US" b="1" kern="100" dirty="0">
+                <a:solidFill>
+                  <a:srgbClr val="0F4761"/>
+                </a:solidFill>
+                <a:latin typeface="Times New Roman" panose="02020603050405020304" pitchFamily="18" charset="0"/>
+              </a:rPr>
+              <a:t>Extra resources </a:t>
+            </a:r>
+          </a:p>
+          <a:p>
+            <a:r>
+              <a:rPr lang="en-US" b="1" kern="100" dirty="0">
+                <a:solidFill>
+                  <a:srgbClr val="0F4761"/>
+                </a:solidFill>
+                <a:latin typeface="Times New Roman" panose="02020603050405020304" pitchFamily="18" charset="0"/>
+              </a:rPr>
+              <a:t>Contact info </a:t>
+            </a:r>
+            <a:endParaRPr lang="en-US" b="1" i="0" u="none" strike="noStrike" kern="100" baseline="0" dirty="0">
               <a:solidFill>
                 <a:srgbClr val="0F4761"/>
               </a:solidFill>
@@ -4432,56 +4613,144 @@
           </a:p>
         </p:txBody>
       </p:sp>
-      <p:sp>
-        <p:nvSpPr>
-          <p:cNvPr id="3" name="Text Placeholder 2">
-            <a:extLst>
-              <a:ext uri="{FF2B5EF4-FFF2-40B4-BE49-F238E27FC236}">
-                <a16:creationId xmlns:a16="http://schemas.microsoft.com/office/drawing/2014/main" id="{E389C721-BBD5-4A0D-DE68-E98B8582D701}"/>
-              </a:ext>
-            </a:extLst>
-          </p:cNvPr>
-          <p:cNvSpPr>
-            <a:spLocks noGrp="1"/>
-          </p:cNvSpPr>
-          <p:nvPr>
-            <p:ph type="body" idx="1"/>
-          </p:nvPr>
-        </p:nvSpPr>
-        <p:spPr/>
-        <p:txBody>
-          <a:bodyPr/>
-          <a:lstStyle/>
-          <a:p>
-            <a:pPr marR="0" lvl="0" rtl="0"/>
-            <a:r>
-              <a:rPr lang="en-US" b="0" i="0" u="none" strike="noStrike" kern="100" baseline="0">
-                <a:solidFill>
-                  <a:srgbClr val="0F4761"/>
-                </a:solidFill>
-                <a:latin typeface="Times New Roman" panose="02020603050405020304" pitchFamily="18" charset="0"/>
-              </a:rPr>
-              <a:t>    ◦ Open for questions.</a:t>
-            </a:r>
-          </a:p>
-          <a:p>
-            <a:pPr marR="0" lvl="0" rtl="0"/>
-            <a:r>
-              <a:rPr lang="en-US" b="0" i="0" u="none" strike="noStrike" kern="100" baseline="0">
-                <a:solidFill>
-                  <a:srgbClr val="0F4761"/>
-                </a:solidFill>
-                <a:latin typeface="Times New Roman" panose="02020603050405020304" pitchFamily="18" charset="0"/>
-              </a:rPr>
-              <a:t>--------------------------------------------------------------------------------</a:t>
-            </a:r>
-          </a:p>
-        </p:txBody>
-      </p:sp>
+      <p:pic>
+        <p:nvPicPr>
+          <p:cNvPr id="5" name="Picture 4" descr="A qr code on a white square&#10;&#10;AI-generated content may be incorrect.">
+            <a:extLst>
+              <a:ext uri="{FF2B5EF4-FFF2-40B4-BE49-F238E27FC236}">
+                <a16:creationId xmlns:a16="http://schemas.microsoft.com/office/drawing/2014/main" id="{4409B6CF-0080-709E-C7CA-0669B3C51572}"/>
+              </a:ext>
+            </a:extLst>
+          </p:cNvPr>
+          <p:cNvPicPr>
+            <a:picLocks noChangeAspect="1"/>
+          </p:cNvPicPr>
+          <p:nvPr/>
+        </p:nvPicPr>
+        <p:blipFill>
+          <a:blip r:embed="rId2">
+            <a:extLst>
+              <a:ext uri="{28A0092B-C50C-407E-A947-70E740481C1C}">
+                <a14:useLocalDpi xmlns:a14="http://schemas.microsoft.com/office/drawing/2010/main" val="0"/>
+              </a:ext>
+            </a:extLst>
+          </a:blip>
+          <a:stretch>
+            <a:fillRect/>
+          </a:stretch>
+        </p:blipFill>
+        <p:spPr>
+          <a:xfrm>
+            <a:off x="667512" y="2180336"/>
+            <a:ext cx="4165600" cy="4165600"/>
+          </a:xfrm>
+          <a:prstGeom prst="rect">
+            <a:avLst/>
+          </a:prstGeom>
+        </p:spPr>
+      </p:pic>
+      <p:sp>
+        <p:nvSpPr>
+          <p:cNvPr id="6" name="Arrow: Left 5">
+            <a:extLst>
+              <a:ext uri="{FF2B5EF4-FFF2-40B4-BE49-F238E27FC236}">
+                <a16:creationId xmlns:a16="http://schemas.microsoft.com/office/drawing/2014/main" id="{1F4F6AB7-3798-A891-B201-C58F2EA46FC0}"/>
+              </a:ext>
+            </a:extLst>
+          </p:cNvPr>
+          <p:cNvSpPr/>
+          <p:nvPr/>
+        </p:nvSpPr>
+        <p:spPr>
+          <a:xfrm>
+            <a:off x="4898135" y="5879592"/>
+            <a:ext cx="2139190" cy="384048"/>
+          </a:xfrm>
+          <a:prstGeom prst="leftArrow">
+            <a:avLst/>
+          </a:prstGeom>
+        </p:spPr>
+        <p:style>
+          <a:lnRef idx="2">
+            <a:schemeClr val="accent4">
+              <a:shade val="15000"/>
+            </a:schemeClr>
+          </a:lnRef>
+          <a:fillRef idx="1">
+            <a:schemeClr val="accent4"/>
+          </a:fillRef>
+          <a:effectRef idx="0">
+            <a:schemeClr val="accent4"/>
+          </a:effectRef>
+          <a:fontRef idx="minor">
+            <a:schemeClr val="lt1"/>
+          </a:fontRef>
+        </p:style>
+        <p:txBody>
+          <a:bodyPr rtlCol="0" anchor="ctr"/>
+          <a:lstStyle/>
+          <a:p>
+            <a:pPr algn="ctr"/>
+            <a:endParaRPr lang="en-US"/>
+          </a:p>
+        </p:txBody>
+      </p:sp>
+      <p:pic>
+        <p:nvPicPr>
+          <p:cNvPr id="8" name="Picture 7" descr="A person and person posing for a picture with a baby&#10;&#10;AI-generated content may be incorrect.">
+            <a:extLst>
+              <a:ext uri="{FF2B5EF4-FFF2-40B4-BE49-F238E27FC236}">
+                <a16:creationId xmlns:a16="http://schemas.microsoft.com/office/drawing/2014/main" id="{4961847D-80F1-A0DE-8E87-EF44C4F1DDBB}"/>
+              </a:ext>
+            </a:extLst>
+          </p:cNvPr>
+          <p:cNvPicPr>
+            <a:picLocks noChangeAspect="1"/>
+          </p:cNvPicPr>
+          <p:nvPr/>
+        </p:nvPicPr>
+        <p:blipFill>
+          <a:blip r:embed="rId3">
+            <a:extLst>
+              <a:ext uri="{28A0092B-C50C-407E-A947-70E740481C1C}">
+                <a14:useLocalDpi xmlns:a14="http://schemas.microsoft.com/office/drawing/2010/main" val="0"/>
+              </a:ext>
+            </a:extLst>
+          </a:blip>
+          <a:stretch>
+            <a:fillRect/>
+          </a:stretch>
+        </p:blipFill>
+        <p:spPr>
+          <a:xfrm rot="299344">
+            <a:off x="7043184" y="1217367"/>
+            <a:ext cx="4566581" cy="3424936"/>
+          </a:xfrm>
+          <a:prstGeom prst="round2DiagRect">
+            <a:avLst>
+              <a:gd name="adj1" fmla="val 16667"/>
+              <a:gd name="adj2" fmla="val 0"/>
+            </a:avLst>
+          </a:prstGeom>
+          <a:ln w="88900" cap="sq">
+            <a:solidFill>
+              <a:srgbClr val="FFFFFF"/>
+            </a:solidFill>
+            <a:miter lim="800000"/>
+          </a:ln>
+          <a:effectLst>
+            <a:outerShdw blurRad="254000" algn="tl" rotWithShape="0">
+              <a:srgbClr val="000000">
+                <a:alpha val="43000"/>
+              </a:srgbClr>
+            </a:outerShdw>
+          </a:effectLst>
+        </p:spPr>
+      </p:pic>
     </p:spTree>
     <p:extLst>
       <p:ext uri="{BB962C8B-B14F-4D97-AF65-F5344CB8AC3E}">
-        <p14:creationId xmlns:p14="http://schemas.microsoft.com/office/powerpoint/2010/main" val="283059098"/>
+        <p14:creationId xmlns:p14="http://schemas.microsoft.com/office/powerpoint/2010/main" val="3213802642"/>
       </p:ext>
     </p:extLst>
   </p:cSld>

</xml_diff>